<commit_message>
added uart to comm protocol notebook
</commit_message>
<xml_diff>
--- a/blogs/comm_protocol/figures.pptx
+++ b/blogs/comm_protocol/figures.pptx
@@ -5,7 +5,7 @@
     <p:sldMasterId id="2147483648" r:id="rId1"/>
   </p:sldMasterIdLst>
   <p:sldIdLst>
-    <p:sldId id="308" r:id="rId2"/>
+    <p:sldId id="309" r:id="rId2"/>
     <p:sldId id="288" r:id="rId3"/>
     <p:sldId id="282" r:id="rId4"/>
   </p:sldIdLst>
@@ -3316,7 +3316,13 @@
   <p:cSld>
     <p:spTree>
       <p:nvGrpSpPr>
-        <p:cNvPr id="1" name=""/>
+        <p:cNvPr id="1" name="">
+          <a:extLst>
+            <a:ext uri="{FF2B5EF4-FFF2-40B4-BE49-F238E27FC236}">
+              <a16:creationId xmlns:a16="http://schemas.microsoft.com/office/drawing/2014/main" id="{8B5DF6A8-27A5-D450-80B8-6CF9E380F378}"/>
+            </a:ext>
+          </a:extLst>
+        </p:cNvPr>
         <p:cNvGrpSpPr/>
         <p:nvPr/>
       </p:nvGrpSpPr>
@@ -3333,7 +3339,7 @@
           <p:cNvPr id="30" name="Group 29">
             <a:extLst>
               <a:ext uri="{FF2B5EF4-FFF2-40B4-BE49-F238E27FC236}">
-                <a16:creationId xmlns:a16="http://schemas.microsoft.com/office/drawing/2014/main" id="{048EF4AA-A00E-270C-EDD9-38B892D85D72}"/>
+                <a16:creationId xmlns:a16="http://schemas.microsoft.com/office/drawing/2014/main" id="{26CCBF09-77F8-E811-D1BB-29D2873EA6C6}"/>
               </a:ext>
             </a:extLst>
           </p:cNvPr>
@@ -3342,10 +3348,10 @@
         </p:nvGrpSpPr>
         <p:grpSpPr>
           <a:xfrm>
-            <a:off x="1524000" y="2514600"/>
-            <a:ext cx="9144000" cy="1828800"/>
-            <a:chOff x="1872343" y="1698172"/>
-            <a:chExt cx="9144000" cy="1828800"/>
+            <a:off x="609600" y="2514600"/>
+            <a:ext cx="10972800" cy="1828800"/>
+            <a:chOff x="957943" y="1698172"/>
+            <a:chExt cx="10972800" cy="1828800"/>
           </a:xfrm>
         </p:grpSpPr>
         <p:grpSp>
@@ -3353,7 +3359,7 @@
             <p:cNvPr id="28" name="Group 27">
               <a:extLst>
                 <a:ext uri="{FF2B5EF4-FFF2-40B4-BE49-F238E27FC236}">
-                  <a16:creationId xmlns:a16="http://schemas.microsoft.com/office/drawing/2014/main" id="{646585D3-33F5-EF22-FCBF-5F5BBB3142BC}"/>
+                  <a16:creationId xmlns:a16="http://schemas.microsoft.com/office/drawing/2014/main" id="{B01EB20A-6651-AD5B-2D30-F2F986330431}"/>
                 </a:ext>
               </a:extLst>
             </p:cNvPr>
@@ -3362,20 +3368,20 @@
           </p:nvGrpSpPr>
           <p:grpSpPr>
             <a:xfrm>
-              <a:off x="1872343" y="1698172"/>
-              <a:ext cx="3657600" cy="1828800"/>
-              <a:chOff x="1872343" y="1698172"/>
-              <a:chExt cx="3657600" cy="1828800"/>
+              <a:off x="957943" y="1698172"/>
+              <a:ext cx="4572000" cy="1828800"/>
+              <a:chOff x="957943" y="1698172"/>
+              <a:chExt cx="4572000" cy="1828800"/>
             </a:xfrm>
           </p:grpSpPr>
-          <mc:AlternateContent xmlns:mc="http://schemas.openxmlformats.org/markup-compatibility/2006" xmlns:a14="http://schemas.microsoft.com/office/drawing/2010/main">
-            <mc:Choice Requires="a14">
+          <mc:AlternateContent xmlns:mc="http://schemas.openxmlformats.org/markup-compatibility/2006">
+            <mc:Choice xmlns:a14="http://schemas.microsoft.com/office/drawing/2010/main" Requires="a14">
               <p:sp>
                 <p:nvSpPr>
                   <p:cNvPr id="2" name="Rectangle 1">
                     <a:extLst>
                       <a:ext uri="{FF2B5EF4-FFF2-40B4-BE49-F238E27FC236}">
-                        <a16:creationId xmlns:a16="http://schemas.microsoft.com/office/drawing/2014/main" id="{CCD1D388-B880-2DBD-0114-A6B4CC54B860}"/>
+                        <a16:creationId xmlns:a16="http://schemas.microsoft.com/office/drawing/2014/main" id="{69411127-FC53-C0CF-FBA6-8C10AF8E6D08}"/>
                       </a:ext>
                     </a:extLst>
                   </p:cNvPr>
@@ -3445,13 +3451,13 @@
                 </p:txBody>
               </p:sp>
             </mc:Choice>
-            <mc:Fallback xmlns="">
+            <mc:Fallback>
               <p:sp>
                 <p:nvSpPr>
                   <p:cNvPr id="2" name="Rectangle 1">
                     <a:extLst>
                       <a:ext uri="{FF2B5EF4-FFF2-40B4-BE49-F238E27FC236}">
-                        <a16:creationId xmlns:a16="http://schemas.microsoft.com/office/drawing/2014/main" id="{CCD1D388-B880-2DBD-0114-A6B4CC54B860}"/>
+                        <a16:creationId xmlns:a16="http://schemas.microsoft.com/office/drawing/2014/main" id="{69411127-FC53-C0CF-FBA6-8C10AF8E6D08}"/>
                       </a:ext>
                     </a:extLst>
                   </p:cNvPr>
@@ -3490,14 +3496,14 @@
               </p:sp>
             </mc:Fallback>
           </mc:AlternateContent>
-          <mc:AlternateContent xmlns:mc="http://schemas.openxmlformats.org/markup-compatibility/2006" xmlns:a14="http://schemas.microsoft.com/office/drawing/2010/main">
-            <mc:Choice Requires="a14">
+          <mc:AlternateContent xmlns:mc="http://schemas.openxmlformats.org/markup-compatibility/2006">
+            <mc:Choice xmlns:a14="http://schemas.microsoft.com/office/drawing/2010/main" Requires="a14">
               <p:sp>
                 <p:nvSpPr>
                   <p:cNvPr id="3" name="Rectangle 2">
                     <a:extLst>
                       <a:ext uri="{FF2B5EF4-FFF2-40B4-BE49-F238E27FC236}">
-                        <a16:creationId xmlns:a16="http://schemas.microsoft.com/office/drawing/2014/main" id="{47F88B45-A004-3D1C-94A4-8CA38870EB3B}"/>
+                        <a16:creationId xmlns:a16="http://schemas.microsoft.com/office/drawing/2014/main" id="{BF271587-8B32-78F9-62B3-D802B91274DE}"/>
                       </a:ext>
                     </a:extLst>
                   </p:cNvPr>
@@ -3615,13 +3621,13 @@
                 </p:txBody>
               </p:sp>
             </mc:Choice>
-            <mc:Fallback xmlns="">
+            <mc:Fallback>
               <p:sp>
                 <p:nvSpPr>
                   <p:cNvPr id="3" name="Rectangle 2">
                     <a:extLst>
                       <a:ext uri="{FF2B5EF4-FFF2-40B4-BE49-F238E27FC236}">
-                        <a16:creationId xmlns:a16="http://schemas.microsoft.com/office/drawing/2014/main" id="{47F88B45-A004-3D1C-94A4-8CA38870EB3B}"/>
+                        <a16:creationId xmlns:a16="http://schemas.microsoft.com/office/drawing/2014/main" id="{BF271587-8B32-78F9-62B3-D802B91274DE}"/>
                       </a:ext>
                     </a:extLst>
                   </p:cNvPr>
@@ -3660,14 +3666,14 @@
               </p:sp>
             </mc:Fallback>
           </mc:AlternateContent>
-          <mc:AlternateContent xmlns:mc="http://schemas.openxmlformats.org/markup-compatibility/2006" xmlns:a14="http://schemas.microsoft.com/office/drawing/2010/main">
-            <mc:Choice Requires="a14">
+          <mc:AlternateContent xmlns:mc="http://schemas.openxmlformats.org/markup-compatibility/2006">
+            <mc:Choice xmlns:a14="http://schemas.microsoft.com/office/drawing/2010/main" Requires="a14">
               <p:sp>
                 <p:nvSpPr>
                   <p:cNvPr id="4" name="Rectangle 3">
                     <a:extLst>
                       <a:ext uri="{FF2B5EF4-FFF2-40B4-BE49-F238E27FC236}">
-                        <a16:creationId xmlns:a16="http://schemas.microsoft.com/office/drawing/2014/main" id="{BB39D327-CF60-DC0B-AE30-AC1099F2F3B1}"/>
+                        <a16:creationId xmlns:a16="http://schemas.microsoft.com/office/drawing/2014/main" id="{80CA7F2C-A20C-B7E4-AD5B-F678EACEF1B5}"/>
                       </a:ext>
                     </a:extLst>
                   </p:cNvPr>
@@ -3755,13 +3761,13 @@
                 </p:txBody>
               </p:sp>
             </mc:Choice>
-            <mc:Fallback xmlns="">
+            <mc:Fallback>
               <p:sp>
                 <p:nvSpPr>
                   <p:cNvPr id="4" name="Rectangle 3">
                     <a:extLst>
                       <a:ext uri="{FF2B5EF4-FFF2-40B4-BE49-F238E27FC236}">
-                        <a16:creationId xmlns:a16="http://schemas.microsoft.com/office/drawing/2014/main" id="{BB39D327-CF60-DC0B-AE30-AC1099F2F3B1}"/>
+                        <a16:creationId xmlns:a16="http://schemas.microsoft.com/office/drawing/2014/main" id="{80CA7F2C-A20C-B7E4-AD5B-F678EACEF1B5}"/>
                       </a:ext>
                     </a:extLst>
                   </p:cNvPr>
@@ -3800,14 +3806,14 @@
               </p:sp>
             </mc:Fallback>
           </mc:AlternateContent>
-          <mc:AlternateContent xmlns:mc="http://schemas.openxmlformats.org/markup-compatibility/2006" xmlns:a14="http://schemas.microsoft.com/office/drawing/2010/main">
-            <mc:Choice Requires="a14">
+          <mc:AlternateContent xmlns:mc="http://schemas.openxmlformats.org/markup-compatibility/2006">
+            <mc:Choice xmlns:a14="http://schemas.microsoft.com/office/drawing/2010/main" Requires="a14">
               <p:sp>
                 <p:nvSpPr>
                   <p:cNvPr id="5" name="Rectangle 4">
                     <a:extLst>
                       <a:ext uri="{FF2B5EF4-FFF2-40B4-BE49-F238E27FC236}">
-                        <a16:creationId xmlns:a16="http://schemas.microsoft.com/office/drawing/2014/main" id="{26CF66F1-1630-85AC-BE8F-BCF43E696F98}"/>
+                        <a16:creationId xmlns:a16="http://schemas.microsoft.com/office/drawing/2014/main" id="{378DC70F-FCD8-5C24-DC98-A297EFCE59E2}"/>
                       </a:ext>
                     </a:extLst>
                   </p:cNvPr>
@@ -3895,13 +3901,13 @@
                 </p:txBody>
               </p:sp>
             </mc:Choice>
-            <mc:Fallback xmlns="">
+            <mc:Fallback>
               <p:sp>
                 <p:nvSpPr>
                   <p:cNvPr id="5" name="Rectangle 4">
                     <a:extLst>
                       <a:ext uri="{FF2B5EF4-FFF2-40B4-BE49-F238E27FC236}">
-                        <a16:creationId xmlns:a16="http://schemas.microsoft.com/office/drawing/2014/main" id="{26CF66F1-1630-85AC-BE8F-BCF43E696F98}"/>
+                        <a16:creationId xmlns:a16="http://schemas.microsoft.com/office/drawing/2014/main" id="{378DC70F-FCD8-5C24-DC98-A297EFCE59E2}"/>
                       </a:ext>
                     </a:extLst>
                   </p:cNvPr>
@@ -3940,14 +3946,14 @@
               </p:sp>
             </mc:Fallback>
           </mc:AlternateContent>
-          <mc:AlternateContent xmlns:mc="http://schemas.openxmlformats.org/markup-compatibility/2006" xmlns:a14="http://schemas.microsoft.com/office/drawing/2010/main">
-            <mc:Choice Requires="a14">
+          <mc:AlternateContent xmlns:mc="http://schemas.openxmlformats.org/markup-compatibility/2006">
+            <mc:Choice xmlns:a14="http://schemas.microsoft.com/office/drawing/2010/main" Requires="a14">
               <p:sp>
                 <p:nvSpPr>
                   <p:cNvPr id="6" name="Rectangle 5">
                     <a:extLst>
                       <a:ext uri="{FF2B5EF4-FFF2-40B4-BE49-F238E27FC236}">
-                        <a16:creationId xmlns:a16="http://schemas.microsoft.com/office/drawing/2014/main" id="{3DA0DCD6-A2CB-08F3-398E-8765371C4D29}"/>
+                        <a16:creationId xmlns:a16="http://schemas.microsoft.com/office/drawing/2014/main" id="{8C549058-CF0A-9291-A98C-989E5C4FACC1}"/>
                       </a:ext>
                     </a:extLst>
                   </p:cNvPr>
@@ -3956,8 +3962,8 @@
                 </p:nvSpPr>
                 <p:spPr>
                   <a:xfrm>
-                    <a:off x="1872343" y="1698172"/>
-                    <a:ext cx="1828800" cy="1828800"/>
+                    <a:off x="957943" y="1698172"/>
+                    <a:ext cx="2743200" cy="1828800"/>
                   </a:xfrm>
                   <a:prstGeom prst="rect">
                     <a:avLst/>
@@ -4023,6 +4029,24 @@
                             </a:rPr>
                             <m:t>𝑴𝒂𝒔𝒕𝒆𝒓</m:t>
                           </m:r>
+                          <m:r>
+                            <a:rPr lang="en-US" b="1" i="1" smtClean="0">
+                              <a:solidFill>
+                                <a:schemeClr val="tx1"/>
+                              </a:solidFill>
+                              <a:latin typeface="Cambria Math" panose="02040503050406030204" pitchFamily="18" charset="0"/>
+                            </a:rPr>
+                            <m:t>/</m:t>
+                          </m:r>
+                          <m:r>
+                            <a:rPr lang="en-US" b="1" i="1" smtClean="0">
+                              <a:solidFill>
+                                <a:schemeClr val="tx1"/>
+                              </a:solidFill>
+                              <a:latin typeface="Cambria Math" panose="02040503050406030204" pitchFamily="18" charset="0"/>
+                            </a:rPr>
+                            <m:t>𝑪𝒐𝒏𝒕𝒓𝒐𝒍𝒍𝒆𝒓</m:t>
+                          </m:r>
                         </m:oMath>
                       </m:oMathPara>
                     </a14:m>
@@ -4035,13 +4059,13 @@
                 </p:txBody>
               </p:sp>
             </mc:Choice>
-            <mc:Fallback xmlns="">
+            <mc:Fallback>
               <p:sp>
                 <p:nvSpPr>
                   <p:cNvPr id="6" name="Rectangle 5">
                     <a:extLst>
                       <a:ext uri="{FF2B5EF4-FFF2-40B4-BE49-F238E27FC236}">
-                        <a16:creationId xmlns:a16="http://schemas.microsoft.com/office/drawing/2014/main" id="{3DA0DCD6-A2CB-08F3-398E-8765371C4D29}"/>
+                        <a16:creationId xmlns:a16="http://schemas.microsoft.com/office/drawing/2014/main" id="{8C549058-CF0A-9291-A98C-989E5C4FACC1}"/>
                       </a:ext>
                     </a:extLst>
                   </p:cNvPr>
@@ -4052,8 +4076,8 @@
                 </p:nvSpPr>
                 <p:spPr>
                   <a:xfrm>
-                    <a:off x="1872343" y="1698172"/>
-                    <a:ext cx="1828800" cy="1828800"/>
+                    <a:off x="957943" y="1698172"/>
+                    <a:ext cx="2743200" cy="1828800"/>
                   </a:xfrm>
                   <a:prstGeom prst="rect">
                     <a:avLst/>
@@ -4086,7 +4110,7 @@
             <p:cNvPr id="29" name="Group 28">
               <a:extLst>
                 <a:ext uri="{FF2B5EF4-FFF2-40B4-BE49-F238E27FC236}">
-                  <a16:creationId xmlns:a16="http://schemas.microsoft.com/office/drawing/2014/main" id="{8331AEED-C03A-2EC8-286B-0EFBECF33922}"/>
+                  <a16:creationId xmlns:a16="http://schemas.microsoft.com/office/drawing/2014/main" id="{82E7B029-1519-8514-C154-B101C255A15B}"/>
                 </a:ext>
               </a:extLst>
             </p:cNvPr>
@@ -4096,19 +4120,19 @@
           <p:grpSpPr>
             <a:xfrm>
               <a:off x="7358743" y="1698172"/>
-              <a:ext cx="3657600" cy="1828800"/>
+              <a:ext cx="4572000" cy="1828800"/>
               <a:chOff x="7358743" y="1698172"/>
-              <a:chExt cx="3657600" cy="1828800"/>
+              <a:chExt cx="4572000" cy="1828800"/>
             </a:xfrm>
           </p:grpSpPr>
-          <mc:AlternateContent xmlns:mc="http://schemas.openxmlformats.org/markup-compatibility/2006" xmlns:a14="http://schemas.microsoft.com/office/drawing/2010/main">
-            <mc:Choice Requires="a14">
+          <mc:AlternateContent xmlns:mc="http://schemas.openxmlformats.org/markup-compatibility/2006">
+            <mc:Choice xmlns:a14="http://schemas.microsoft.com/office/drawing/2010/main" Requires="a14">
               <p:sp>
                 <p:nvSpPr>
                   <p:cNvPr id="7" name="Rectangle 6">
                     <a:extLst>
                       <a:ext uri="{FF2B5EF4-FFF2-40B4-BE49-F238E27FC236}">
-                        <a16:creationId xmlns:a16="http://schemas.microsoft.com/office/drawing/2014/main" id="{44E28E50-C6E5-8A6F-385F-067E2B248CB4}"/>
+                        <a16:creationId xmlns:a16="http://schemas.microsoft.com/office/drawing/2014/main" id="{558791B4-F3FA-EFAA-A481-6431BA1DA93B}"/>
                       </a:ext>
                     </a:extLst>
                   </p:cNvPr>
@@ -4178,13 +4202,13 @@
                 </p:txBody>
               </p:sp>
             </mc:Choice>
-            <mc:Fallback xmlns="">
+            <mc:Fallback>
               <p:sp>
                 <p:nvSpPr>
                   <p:cNvPr id="7" name="Rectangle 6">
                     <a:extLst>
                       <a:ext uri="{FF2B5EF4-FFF2-40B4-BE49-F238E27FC236}">
-                        <a16:creationId xmlns:a16="http://schemas.microsoft.com/office/drawing/2014/main" id="{44E28E50-C6E5-8A6F-385F-067E2B248CB4}"/>
+                        <a16:creationId xmlns:a16="http://schemas.microsoft.com/office/drawing/2014/main" id="{558791B4-F3FA-EFAA-A481-6431BA1DA93B}"/>
                       </a:ext>
                     </a:extLst>
                   </p:cNvPr>
@@ -4223,14 +4247,14 @@
               </p:sp>
             </mc:Fallback>
           </mc:AlternateContent>
-          <mc:AlternateContent xmlns:mc="http://schemas.openxmlformats.org/markup-compatibility/2006" xmlns:a14="http://schemas.microsoft.com/office/drawing/2010/main">
-            <mc:Choice Requires="a14">
+          <mc:AlternateContent xmlns:mc="http://schemas.openxmlformats.org/markup-compatibility/2006">
+            <mc:Choice xmlns:a14="http://schemas.microsoft.com/office/drawing/2010/main" Requires="a14">
               <p:sp>
                 <p:nvSpPr>
                   <p:cNvPr id="8" name="Rectangle 7">
                     <a:extLst>
                       <a:ext uri="{FF2B5EF4-FFF2-40B4-BE49-F238E27FC236}">
-                        <a16:creationId xmlns:a16="http://schemas.microsoft.com/office/drawing/2014/main" id="{F9741570-817D-BA65-E2CF-20DEC3FB6984}"/>
+                        <a16:creationId xmlns:a16="http://schemas.microsoft.com/office/drawing/2014/main" id="{04AF1CF9-5C28-68E9-CBD3-8BCD657A8C35}"/>
                       </a:ext>
                     </a:extLst>
                   </p:cNvPr>
@@ -4348,13 +4372,13 @@
                 </p:txBody>
               </p:sp>
             </mc:Choice>
-            <mc:Fallback xmlns="">
+            <mc:Fallback>
               <p:sp>
                 <p:nvSpPr>
                   <p:cNvPr id="8" name="Rectangle 7">
                     <a:extLst>
                       <a:ext uri="{FF2B5EF4-FFF2-40B4-BE49-F238E27FC236}">
-                        <a16:creationId xmlns:a16="http://schemas.microsoft.com/office/drawing/2014/main" id="{F9741570-817D-BA65-E2CF-20DEC3FB6984}"/>
+                        <a16:creationId xmlns:a16="http://schemas.microsoft.com/office/drawing/2014/main" id="{04AF1CF9-5C28-68E9-CBD3-8BCD657A8C35}"/>
                       </a:ext>
                     </a:extLst>
                   </p:cNvPr>
@@ -4393,14 +4417,14 @@
               </p:sp>
             </mc:Fallback>
           </mc:AlternateContent>
-          <mc:AlternateContent xmlns:mc="http://schemas.openxmlformats.org/markup-compatibility/2006" xmlns:a14="http://schemas.microsoft.com/office/drawing/2010/main">
-            <mc:Choice Requires="a14">
+          <mc:AlternateContent xmlns:mc="http://schemas.openxmlformats.org/markup-compatibility/2006">
+            <mc:Choice xmlns:a14="http://schemas.microsoft.com/office/drawing/2010/main" Requires="a14">
               <p:sp>
                 <p:nvSpPr>
                   <p:cNvPr id="9" name="Rectangle 8">
                     <a:extLst>
                       <a:ext uri="{FF2B5EF4-FFF2-40B4-BE49-F238E27FC236}">
-                        <a16:creationId xmlns:a16="http://schemas.microsoft.com/office/drawing/2014/main" id="{4C585C67-2409-B82F-DF66-21EF1B6FE185}"/>
+                        <a16:creationId xmlns:a16="http://schemas.microsoft.com/office/drawing/2014/main" id="{D26CA634-5231-C7D4-056C-C0D08031839E}"/>
                       </a:ext>
                     </a:extLst>
                   </p:cNvPr>
@@ -4488,13 +4512,13 @@
                 </p:txBody>
               </p:sp>
             </mc:Choice>
-            <mc:Fallback xmlns="">
+            <mc:Fallback>
               <p:sp>
                 <p:nvSpPr>
                   <p:cNvPr id="9" name="Rectangle 8">
                     <a:extLst>
                       <a:ext uri="{FF2B5EF4-FFF2-40B4-BE49-F238E27FC236}">
-                        <a16:creationId xmlns:a16="http://schemas.microsoft.com/office/drawing/2014/main" id="{4C585C67-2409-B82F-DF66-21EF1B6FE185}"/>
+                        <a16:creationId xmlns:a16="http://schemas.microsoft.com/office/drawing/2014/main" id="{D26CA634-5231-C7D4-056C-C0D08031839E}"/>
                       </a:ext>
                     </a:extLst>
                   </p:cNvPr>
@@ -4533,14 +4557,14 @@
               </p:sp>
             </mc:Fallback>
           </mc:AlternateContent>
-          <mc:AlternateContent xmlns:mc="http://schemas.openxmlformats.org/markup-compatibility/2006" xmlns:a14="http://schemas.microsoft.com/office/drawing/2010/main">
-            <mc:Choice Requires="a14">
+          <mc:AlternateContent xmlns:mc="http://schemas.openxmlformats.org/markup-compatibility/2006">
+            <mc:Choice xmlns:a14="http://schemas.microsoft.com/office/drawing/2010/main" Requires="a14">
               <p:sp>
                 <p:nvSpPr>
                   <p:cNvPr id="10" name="Rectangle 9">
                     <a:extLst>
                       <a:ext uri="{FF2B5EF4-FFF2-40B4-BE49-F238E27FC236}">
-                        <a16:creationId xmlns:a16="http://schemas.microsoft.com/office/drawing/2014/main" id="{2B7B362C-817D-B922-4134-E663168ACD71}"/>
+                        <a16:creationId xmlns:a16="http://schemas.microsoft.com/office/drawing/2014/main" id="{0459AD31-A9AD-53CA-CEF4-2E3086656824}"/>
                       </a:ext>
                     </a:extLst>
                   </p:cNvPr>
@@ -4628,13 +4652,13 @@
                 </p:txBody>
               </p:sp>
             </mc:Choice>
-            <mc:Fallback xmlns="">
+            <mc:Fallback>
               <p:sp>
                 <p:nvSpPr>
                   <p:cNvPr id="10" name="Rectangle 9">
                     <a:extLst>
                       <a:ext uri="{FF2B5EF4-FFF2-40B4-BE49-F238E27FC236}">
-                        <a16:creationId xmlns:a16="http://schemas.microsoft.com/office/drawing/2014/main" id="{2B7B362C-817D-B922-4134-E663168ACD71}"/>
+                        <a16:creationId xmlns:a16="http://schemas.microsoft.com/office/drawing/2014/main" id="{0459AD31-A9AD-53CA-CEF4-2E3086656824}"/>
                       </a:ext>
                     </a:extLst>
                   </p:cNvPr>
@@ -4673,14 +4697,14 @@
               </p:sp>
             </mc:Fallback>
           </mc:AlternateContent>
-          <mc:AlternateContent xmlns:mc="http://schemas.openxmlformats.org/markup-compatibility/2006" xmlns:a14="http://schemas.microsoft.com/office/drawing/2010/main">
-            <mc:Choice Requires="a14">
+          <mc:AlternateContent xmlns:mc="http://schemas.openxmlformats.org/markup-compatibility/2006">
+            <mc:Choice xmlns:a14="http://schemas.microsoft.com/office/drawing/2010/main" Requires="a14">
               <p:sp>
                 <p:nvSpPr>
                   <p:cNvPr id="11" name="Rectangle 10">
                     <a:extLst>
                       <a:ext uri="{FF2B5EF4-FFF2-40B4-BE49-F238E27FC236}">
-                        <a16:creationId xmlns:a16="http://schemas.microsoft.com/office/drawing/2014/main" id="{F2CD5AAC-A735-1000-9BCC-0E844DA2844D}"/>
+                        <a16:creationId xmlns:a16="http://schemas.microsoft.com/office/drawing/2014/main" id="{715C71BB-D654-D231-5341-21F89C997550}"/>
                       </a:ext>
                     </a:extLst>
                   </p:cNvPr>
@@ -4690,7 +4714,7 @@
                 <p:spPr>
                   <a:xfrm>
                     <a:off x="9187543" y="1698172"/>
-                    <a:ext cx="1828800" cy="1828800"/>
+                    <a:ext cx="2743200" cy="1828800"/>
                   </a:xfrm>
                   <a:prstGeom prst="rect">
                     <a:avLst/>
@@ -4756,6 +4780,24 @@
                             </a:rPr>
                             <m:t>𝑺𝒍𝒂𝒗𝒆</m:t>
                           </m:r>
+                          <m:r>
+                            <a:rPr lang="en-US" b="1" i="1" smtClean="0">
+                              <a:solidFill>
+                                <a:schemeClr val="tx1"/>
+                              </a:solidFill>
+                              <a:latin typeface="Cambria Math" panose="02040503050406030204" pitchFamily="18" charset="0"/>
+                            </a:rPr>
+                            <m:t>/</m:t>
+                          </m:r>
+                          <m:r>
+                            <a:rPr lang="en-US" b="1" i="1" smtClean="0">
+                              <a:solidFill>
+                                <a:schemeClr val="tx1"/>
+                              </a:solidFill>
+                              <a:latin typeface="Cambria Math" panose="02040503050406030204" pitchFamily="18" charset="0"/>
+                            </a:rPr>
+                            <m:t>𝑷𝒆𝒓𝒊𝒑𝒉𝒆𝒓𝒂𝒍</m:t>
+                          </m:r>
                         </m:oMath>
                       </m:oMathPara>
                     </a14:m>
@@ -4768,13 +4810,13 @@
                 </p:txBody>
               </p:sp>
             </mc:Choice>
-            <mc:Fallback xmlns="">
+            <mc:Fallback>
               <p:sp>
                 <p:nvSpPr>
                   <p:cNvPr id="11" name="Rectangle 10">
                     <a:extLst>
                       <a:ext uri="{FF2B5EF4-FFF2-40B4-BE49-F238E27FC236}">
-                        <a16:creationId xmlns:a16="http://schemas.microsoft.com/office/drawing/2014/main" id="{F2CD5AAC-A735-1000-9BCC-0E844DA2844D}"/>
+                        <a16:creationId xmlns:a16="http://schemas.microsoft.com/office/drawing/2014/main" id="{715C71BB-D654-D231-5341-21F89C997550}"/>
                       </a:ext>
                     </a:extLst>
                   </p:cNvPr>
@@ -4786,7 +4828,7 @@
                 <p:spPr>
                   <a:xfrm>
                     <a:off x="9187543" y="1698172"/>
-                    <a:ext cx="1828800" cy="1828800"/>
+                    <a:ext cx="2743200" cy="1828800"/>
                   </a:xfrm>
                   <a:prstGeom prst="rect">
                     <a:avLst/>
@@ -4819,7 +4861,7 @@
             <p:cNvPr id="13" name="Straight Arrow Connector 12">
               <a:extLst>
                 <a:ext uri="{FF2B5EF4-FFF2-40B4-BE49-F238E27FC236}">
-                  <a16:creationId xmlns:a16="http://schemas.microsoft.com/office/drawing/2014/main" id="{6180C86C-87E3-09E5-74AE-CA1278A36832}"/>
+                  <a16:creationId xmlns:a16="http://schemas.microsoft.com/office/drawing/2014/main" id="{6FED7183-7F93-B7E9-BC2B-38336459702D}"/>
                 </a:ext>
               </a:extLst>
             </p:cNvPr>
@@ -4864,7 +4906,7 @@
             <p:cNvPr id="15" name="Straight Arrow Connector 14">
               <a:extLst>
                 <a:ext uri="{FF2B5EF4-FFF2-40B4-BE49-F238E27FC236}">
-                  <a16:creationId xmlns:a16="http://schemas.microsoft.com/office/drawing/2014/main" id="{2BA96656-7ED7-F05A-AAB7-B4E1268436F5}"/>
+                  <a16:creationId xmlns:a16="http://schemas.microsoft.com/office/drawing/2014/main" id="{007D7ACA-6A86-D3DB-07B2-6D75257D93F0}"/>
                 </a:ext>
               </a:extLst>
             </p:cNvPr>
@@ -4910,7 +4952,7 @@
             <p:cNvPr id="18" name="Straight Arrow Connector 17">
               <a:extLst>
                 <a:ext uri="{FF2B5EF4-FFF2-40B4-BE49-F238E27FC236}">
-                  <a16:creationId xmlns:a16="http://schemas.microsoft.com/office/drawing/2014/main" id="{D6B18AB1-7727-1246-ADB2-97AB7337108F}"/>
+                  <a16:creationId xmlns:a16="http://schemas.microsoft.com/office/drawing/2014/main" id="{E2BEA339-0D94-71AE-8FDD-A55318A008B0}"/>
                 </a:ext>
               </a:extLst>
             </p:cNvPr>
@@ -4956,7 +4998,7 @@
             <p:cNvPr id="21" name="Straight Arrow Connector 20">
               <a:extLst>
                 <a:ext uri="{FF2B5EF4-FFF2-40B4-BE49-F238E27FC236}">
-                  <a16:creationId xmlns:a16="http://schemas.microsoft.com/office/drawing/2014/main" id="{A4850E23-411F-FF8B-DA27-4D29B7FE0CF8}"/>
+                  <a16:creationId xmlns:a16="http://schemas.microsoft.com/office/drawing/2014/main" id="{487A9FDB-9D0E-0B8D-FA67-CA324E64F614}"/>
                 </a:ext>
               </a:extLst>
             </p:cNvPr>
@@ -5001,7 +5043,7 @@
     </p:spTree>
     <p:extLst>
       <p:ext uri="{BB962C8B-B14F-4D97-AF65-F5344CB8AC3E}">
-        <p14:creationId xmlns:p14="http://schemas.microsoft.com/office/powerpoint/2010/main" val="2120820517"/>
+        <p14:creationId xmlns:p14="http://schemas.microsoft.com/office/powerpoint/2010/main" val="3005186894"/>
       </p:ext>
     </p:extLst>
   </p:cSld>

</xml_diff>